<commit_message>
API ML support in CLI extensions
Signed-off-by: Petr Plavjanik <petr.plavjanik@broadcom.com>
</commit_message>
<xml_diff>
--- a/docs/images/common/zowe-architecture.pptx
+++ b/docs/images/common/zowe-architecture.pptx
@@ -197,7 +197,7 @@
           <a:p>
             <a:fld id="{26E70E1E-3B7C-8D4D-B700-360134022E14}" type="datetimeFigureOut">
               <a:rPr lang="en-CN" smtClean="0"/>
-              <a:t>9/3/20</a:t>
+              <a:t>11/18/20</a:t>
             </a:fld>
             <a:endParaRPr lang="en-CN"/>
           </a:p>
@@ -699,7 +699,7 @@
           <a:p>
             <a:fld id="{B1DB1BE8-3F77-D044-8747-9903AC5CD864}" type="datetimeFigureOut">
               <a:rPr lang="en-US" smtClean="0"/>
-              <a:t>9/3/20</a:t>
+              <a:t>11/18/20</a:t>
             </a:fld>
             <a:endParaRPr lang="en-US"/>
           </a:p>
@@ -897,7 +897,7 @@
           <a:p>
             <a:fld id="{B1DB1BE8-3F77-D044-8747-9903AC5CD864}" type="datetimeFigureOut">
               <a:rPr lang="en-US" smtClean="0"/>
-              <a:t>9/3/20</a:t>
+              <a:t>11/18/20</a:t>
             </a:fld>
             <a:endParaRPr lang="en-US"/>
           </a:p>
@@ -1105,7 +1105,7 @@
           <a:p>
             <a:fld id="{B1DB1BE8-3F77-D044-8747-9903AC5CD864}" type="datetimeFigureOut">
               <a:rPr lang="en-US" smtClean="0"/>
-              <a:t>9/3/20</a:t>
+              <a:t>11/18/20</a:t>
             </a:fld>
             <a:endParaRPr lang="en-US"/>
           </a:p>
@@ -1303,7 +1303,7 @@
           <a:p>
             <a:fld id="{B1DB1BE8-3F77-D044-8747-9903AC5CD864}" type="datetimeFigureOut">
               <a:rPr lang="en-US" smtClean="0"/>
-              <a:t>9/3/20</a:t>
+              <a:t>11/18/20</a:t>
             </a:fld>
             <a:endParaRPr lang="en-US"/>
           </a:p>
@@ -1578,7 +1578,7 @@
           <a:p>
             <a:fld id="{B1DB1BE8-3F77-D044-8747-9903AC5CD864}" type="datetimeFigureOut">
               <a:rPr lang="en-US" smtClean="0"/>
-              <a:t>9/3/20</a:t>
+              <a:t>11/18/20</a:t>
             </a:fld>
             <a:endParaRPr lang="en-US"/>
           </a:p>
@@ -1843,7 +1843,7 @@
           <a:p>
             <a:fld id="{B1DB1BE8-3F77-D044-8747-9903AC5CD864}" type="datetimeFigureOut">
               <a:rPr lang="en-US" smtClean="0"/>
-              <a:t>9/3/20</a:t>
+              <a:t>11/18/20</a:t>
             </a:fld>
             <a:endParaRPr lang="en-US"/>
           </a:p>
@@ -2255,7 +2255,7 @@
           <a:p>
             <a:fld id="{B1DB1BE8-3F77-D044-8747-9903AC5CD864}" type="datetimeFigureOut">
               <a:rPr lang="en-US" smtClean="0"/>
-              <a:t>9/3/20</a:t>
+              <a:t>11/18/20</a:t>
             </a:fld>
             <a:endParaRPr lang="en-US"/>
           </a:p>
@@ -2396,7 +2396,7 @@
           <a:p>
             <a:fld id="{B1DB1BE8-3F77-D044-8747-9903AC5CD864}" type="datetimeFigureOut">
               <a:rPr lang="en-US" smtClean="0"/>
-              <a:t>9/3/20</a:t>
+              <a:t>11/18/20</a:t>
             </a:fld>
             <a:endParaRPr lang="en-US"/>
           </a:p>
@@ -2509,7 +2509,7 @@
           <a:p>
             <a:fld id="{B1DB1BE8-3F77-D044-8747-9903AC5CD864}" type="datetimeFigureOut">
               <a:rPr lang="en-US" smtClean="0"/>
-              <a:t>9/3/20</a:t>
+              <a:t>11/18/20</a:t>
             </a:fld>
             <a:endParaRPr lang="en-US"/>
           </a:p>
@@ -2820,7 +2820,7 @@
           <a:p>
             <a:fld id="{B1DB1BE8-3F77-D044-8747-9903AC5CD864}" type="datetimeFigureOut">
               <a:rPr lang="en-US" smtClean="0"/>
-              <a:t>9/3/20</a:t>
+              <a:t>11/18/20</a:t>
             </a:fld>
             <a:endParaRPr lang="en-US"/>
           </a:p>
@@ -3108,7 +3108,7 @@
           <a:p>
             <a:fld id="{B1DB1BE8-3F77-D044-8747-9903AC5CD864}" type="datetimeFigureOut">
               <a:rPr lang="en-US" smtClean="0"/>
-              <a:t>9/3/20</a:t>
+              <a:t>11/18/20</a:t>
             </a:fld>
             <a:endParaRPr lang="en-US"/>
           </a:p>
@@ -3349,7 +3349,7 @@
           <a:p>
             <a:fld id="{B1DB1BE8-3F77-D044-8747-9903AC5CD864}" type="datetimeFigureOut">
               <a:rPr lang="en-US" smtClean="0"/>
-              <a:t>9/3/20</a:t>
+              <a:t>11/18/20</a:t>
             </a:fld>
             <a:endParaRPr lang="en-US"/>
           </a:p>
@@ -5114,7 +5114,7 @@
           <a:lstStyle/>
           <a:p>
             <a:r>
-              <a:rPr lang="en-US" sz="1100">
+              <a:rPr lang="en-US" sz="1100" dirty="0">
                 <a:latin typeface="Arial" panose="020B0604020202020204" pitchFamily="34" charset="0"/>
                 <a:ea typeface="Menlo" panose="020B0609030804020204" pitchFamily="49" charset="0"/>
                 <a:cs typeface="Arial" panose="020B0604020202020204" pitchFamily="34" charset="0"/>
@@ -5777,7 +5777,7 @@
         </p:nvSpPr>
         <p:spPr>
           <a:xfrm>
-            <a:off x="1004892" y="3102432"/>
+            <a:off x="1183794" y="3102432"/>
             <a:ext cx="498855" cy="261610"/>
           </a:xfrm>
           <a:prstGeom prst="rect">
@@ -7451,7 +7451,7 @@
           <a:p>
             <a:pPr algn="ctr"/>
             <a:r>
-              <a:rPr lang="en-US" sz="1000">
+              <a:rPr lang="en-US" sz="1000" dirty="0">
                 <a:solidFill>
                   <a:schemeClr val="tx1"/>
                 </a:solidFill>
@@ -7459,7 +7459,7 @@
                 <a:ea typeface="Menlo" charset="0"/>
                 <a:cs typeface="Arial" panose="020B0604020202020204" pitchFamily="34" charset="0"/>
               </a:rPr>
-              <a:t>DB2</a:t>
+              <a:t>Db2</a:t>
             </a:r>
           </a:p>
         </p:txBody>
@@ -7688,7 +7688,7 @@
                 <a:ea typeface="Menlo" panose="020B0609030804020204" pitchFamily="49" charset="0"/>
                 <a:cs typeface="Arial" panose="020B0604020202020204" pitchFamily="34" charset="0"/>
               </a:rPr>
-              <a:t>DB2</a:t>
+              <a:t>Db2</a:t>
             </a:r>
           </a:p>
         </p:txBody>
@@ -8019,7 +8019,7 @@
         <p:spPr>
           <a:xfrm>
             <a:off x="3441899" y="4165134"/>
-            <a:ext cx="639919" cy="338554"/>
+            <a:ext cx="878767" cy="338554"/>
           </a:xfrm>
           <a:prstGeom prst="rect">
             <a:avLst/>
@@ -8042,7 +8042,7 @@
                 <a:latin typeface="Arial" panose="020B0604020202020204" pitchFamily="34" charset="0"/>
                 <a:cs typeface="Arial" panose="020B0604020202020204" pitchFamily="34" charset="0"/>
               </a:rPr>
-              <a:t>node</a:t>
+              <a:t>Node.js</a:t>
             </a:r>
           </a:p>
         </p:txBody>
@@ -8905,7 +8905,7 @@
                 <a:ea typeface="Menlo" panose="020B0609030804020204" pitchFamily="49" charset="0"/>
                 <a:cs typeface="Arial" panose="020B0604020202020204" pitchFamily="34" charset="0"/>
               </a:rPr>
-              <a:t>MQ Console</a:t>
+              <a:t>MQ REST API</a:t>
             </a:r>
           </a:p>
         </p:txBody>
@@ -8939,16 +8939,12 @@
           <a:lstStyle/>
           <a:p>
             <a:r>
-              <a:rPr lang="en-US" sz="1100" dirty="0" err="1">
+              <a:rPr lang="en-US" sz="1100" dirty="0">
                 <a:latin typeface="Arial" panose="020B0604020202020204" pitchFamily="34" charset="0"/>
                 <a:cs typeface="Arial" panose="020B0604020202020204" pitchFamily="34" charset="0"/>
               </a:rPr>
               <a:t>Zowe</a:t>
             </a:r>
-            <a:endParaRPr lang="en-US" sz="1100" dirty="0">
-              <a:latin typeface="Arial" panose="020B0604020202020204" pitchFamily="34" charset="0"/>
-              <a:cs typeface="Arial" panose="020B0604020202020204" pitchFamily="34" charset="0"/>
-            </a:endParaRPr>
           </a:p>
           <a:p>
             <a:r>
@@ -9351,8 +9347,8 @@
         </p:nvSpPr>
         <p:spPr>
           <a:xfrm>
-            <a:off x="8846286" y="2518905"/>
-            <a:ext cx="2157963" cy="235449"/>
+            <a:off x="7229771" y="2518905"/>
+            <a:ext cx="4555055" cy="521681"/>
           </a:xfrm>
           <a:prstGeom prst="rect">
             <a:avLst/>
@@ -9360,17 +9356,35 @@
           <a:noFill/>
         </p:spPr>
         <p:txBody>
-          <a:bodyPr wrap="none" rtlCol="0">
+          <a:bodyPr wrap="square" rtlCol="0">
             <a:spAutoFit/>
           </a:bodyPr>
           <a:lstStyle/>
           <a:p>
+            <a:pPr algn="ctr"/>
             <a:r>
               <a:rPr lang="en-US" sz="930" dirty="0">
                 <a:latin typeface="Arial" panose="020B0604020202020204" pitchFamily="34" charset="0"/>
                 <a:cs typeface="Arial" panose="020B0604020202020204" pitchFamily="34" charset="0"/>
               </a:rPr>
-              <a:t>(optional       needed for    SSO/MFA)</a:t>
+              <a:t>(optional and recommended - needed for SSO/MFA)</a:t>
+            </a:r>
+          </a:p>
+          <a:p>
+            <a:pPr algn="ctr"/>
+            <a:endParaRPr lang="en-US" sz="930" dirty="0">
+              <a:latin typeface="Arial" panose="020B0604020202020204" pitchFamily="34" charset="0"/>
+              <a:cs typeface="Arial" panose="020B0604020202020204" pitchFamily="34" charset="0"/>
+            </a:endParaRPr>
+          </a:p>
+          <a:p>
+            <a:pPr algn="ctr"/>
+            <a:r>
+              <a:rPr lang="en-US" sz="930" dirty="0">
+                <a:latin typeface="Arial" panose="020B0604020202020204" pitchFamily="34" charset="0"/>
+                <a:cs typeface="Arial" panose="020B0604020202020204" pitchFamily="34" charset="0"/>
+              </a:rPr>
+              <a:t>(any HTTP/REST API can be called via APIML)</a:t>
             </a:r>
           </a:p>
         </p:txBody>
@@ -10102,7 +10116,966 @@
                 <a:latin typeface="Arial" panose="020B0604020202020204" pitchFamily="34" charset="0"/>
                 <a:cs typeface="Arial" panose="020B0604020202020204" pitchFamily="34" charset="0"/>
               </a:rPr>
-              <a:t>metal C / C</a:t>
+              <a:t>Metal C / C</a:t>
+            </a:r>
+          </a:p>
+        </p:txBody>
+      </p:sp>
+      <p:cxnSp>
+        <p:nvCxnSpPr>
+          <p:cNvPr id="117" name="Straight Arrow Connector 116">
+            <a:extLst>
+              <a:ext uri="{FF2B5EF4-FFF2-40B4-BE49-F238E27FC236}">
+                <a16:creationId xmlns:a16="http://schemas.microsoft.com/office/drawing/2014/main" id="{A127B11D-C6C6-E444-B9D8-9E895A9B78FA}"/>
+              </a:ext>
+            </a:extLst>
+          </p:cNvPr>
+          <p:cNvCxnSpPr>
+            <a:cxnSpLocks/>
+          </p:cNvCxnSpPr>
+          <p:nvPr/>
+        </p:nvCxnSpPr>
+        <p:spPr>
+          <a:xfrm>
+            <a:off x="1162860" y="1742029"/>
+            <a:ext cx="0" cy="1593362"/>
+          </a:xfrm>
+          <a:prstGeom prst="straightConnector1">
+            <a:avLst/>
+          </a:prstGeom>
+          <a:ln>
+            <a:headEnd type="triangle"/>
+            <a:tailEnd type="triangle"/>
+          </a:ln>
+        </p:spPr>
+        <p:style>
+          <a:lnRef idx="1">
+            <a:schemeClr val="accent1"/>
+          </a:lnRef>
+          <a:fillRef idx="0">
+            <a:schemeClr val="accent1"/>
+          </a:fillRef>
+          <a:effectRef idx="0">
+            <a:schemeClr val="accent1"/>
+          </a:effectRef>
+          <a:fontRef idx="minor">
+            <a:schemeClr val="tx1"/>
+          </a:fontRef>
+        </p:style>
+      </p:cxnSp>
+      <p:sp>
+        <p:nvSpPr>
+          <p:cNvPr id="123" name="TextBox 122">
+            <a:extLst>
+              <a:ext uri="{FF2B5EF4-FFF2-40B4-BE49-F238E27FC236}">
+                <a16:creationId xmlns:a16="http://schemas.microsoft.com/office/drawing/2014/main" id="{BA23E038-1394-0D48-9B67-B60E668ADC90}"/>
+              </a:ext>
+            </a:extLst>
+          </p:cNvPr>
+          <p:cNvSpPr txBox="1"/>
+          <p:nvPr/>
+        </p:nvSpPr>
+        <p:spPr>
+          <a:xfrm>
+            <a:off x="2508021" y="1762792"/>
+            <a:ext cx="1423788" cy="261610"/>
+          </a:xfrm>
+          <a:prstGeom prst="rect">
+            <a:avLst/>
+          </a:prstGeom>
+          <a:noFill/>
+        </p:spPr>
+        <p:txBody>
+          <a:bodyPr wrap="none" rtlCol="0">
+            <a:spAutoFit/>
+          </a:bodyPr>
+          <a:lstStyle/>
+          <a:p>
+            <a:r>
+              <a:rPr lang="en-US" sz="1100" dirty="0">
+                <a:latin typeface="Arial" panose="020B0604020202020204" pitchFamily="34" charset="0"/>
+                <a:ea typeface="Menlo" panose="020B0609030804020204" pitchFamily="49" charset="0"/>
+                <a:cs typeface="Arial" panose="020B0604020202020204" pitchFamily="34" charset="0"/>
+              </a:rPr>
+              <a:t>HTTP, </a:t>
+            </a:r>
+            <a:r>
+              <a:rPr lang="en-US" sz="1100" dirty="0" err="1">
+                <a:latin typeface="Arial" panose="020B0604020202020204" pitchFamily="34" charset="0"/>
+                <a:ea typeface="Menlo" panose="020B0609030804020204" pitchFamily="49" charset="0"/>
+                <a:cs typeface="Arial" panose="020B0604020202020204" pitchFamily="34" charset="0"/>
+              </a:rPr>
+              <a:t>WebSockets</a:t>
+            </a:r>
+            <a:endParaRPr lang="en-US" sz="1100" dirty="0">
+              <a:latin typeface="Arial" panose="020B0604020202020204" pitchFamily="34" charset="0"/>
+              <a:ea typeface="Menlo" panose="020B0609030804020204" pitchFamily="49" charset="0"/>
+              <a:cs typeface="Arial" panose="020B0604020202020204" pitchFamily="34" charset="0"/>
+            </a:endParaRPr>
+          </a:p>
+        </p:txBody>
+      </p:sp>
+      <p:sp>
+        <p:nvSpPr>
+          <p:cNvPr id="144" name="TextBox 143">
+            <a:extLst>
+              <a:ext uri="{FF2B5EF4-FFF2-40B4-BE49-F238E27FC236}">
+                <a16:creationId xmlns:a16="http://schemas.microsoft.com/office/drawing/2014/main" id="{BD08D391-F2C0-1D43-B48A-2CEA61C2EC16}"/>
+              </a:ext>
+            </a:extLst>
+          </p:cNvPr>
+          <p:cNvSpPr txBox="1"/>
+          <p:nvPr/>
+        </p:nvSpPr>
+        <p:spPr>
+          <a:xfrm>
+            <a:off x="7179866" y="1715918"/>
+            <a:ext cx="899605" cy="261610"/>
+          </a:xfrm>
+          <a:prstGeom prst="rect">
+            <a:avLst/>
+          </a:prstGeom>
+          <a:noFill/>
+        </p:spPr>
+        <p:txBody>
+          <a:bodyPr wrap="none" rtlCol="0">
+            <a:spAutoFit/>
+          </a:bodyPr>
+          <a:lstStyle/>
+          <a:p>
+            <a:r>
+              <a:rPr lang="en-US" sz="1100" dirty="0">
+                <a:latin typeface="Arial" panose="020B0604020202020204" pitchFamily="34" charset="0"/>
+                <a:ea typeface="Menlo" panose="020B0609030804020204" pitchFamily="49" charset="0"/>
+                <a:cs typeface="Arial" panose="020B0604020202020204" pitchFamily="34" charset="0"/>
+              </a:rPr>
+              <a:t>HTTP, FTP</a:t>
+            </a:r>
+          </a:p>
+        </p:txBody>
+      </p:sp>
+      <p:sp>
+        <p:nvSpPr>
+          <p:cNvPr id="155" name="TextBox 154">
+            <a:extLst>
+              <a:ext uri="{FF2B5EF4-FFF2-40B4-BE49-F238E27FC236}">
+                <a16:creationId xmlns:a16="http://schemas.microsoft.com/office/drawing/2014/main" id="{F1C5B287-C640-C546-8420-01BBED95D584}"/>
+              </a:ext>
+            </a:extLst>
+          </p:cNvPr>
+          <p:cNvSpPr txBox="1"/>
+          <p:nvPr/>
+        </p:nvSpPr>
+        <p:spPr>
+          <a:xfrm>
+            <a:off x="10888412" y="1728807"/>
+            <a:ext cx="593432" cy="261610"/>
+          </a:xfrm>
+          <a:prstGeom prst="rect">
+            <a:avLst/>
+          </a:prstGeom>
+          <a:noFill/>
+        </p:spPr>
+        <p:txBody>
+          <a:bodyPr wrap="none" rtlCol="0">
+            <a:spAutoFit/>
+          </a:bodyPr>
+          <a:lstStyle/>
+          <a:p>
+            <a:r>
+              <a:rPr lang="en-US" sz="1100" dirty="0">
+                <a:latin typeface="Arial" panose="020B0604020202020204" pitchFamily="34" charset="0"/>
+                <a:ea typeface="Menlo" panose="020B0609030804020204" pitchFamily="49" charset="0"/>
+                <a:cs typeface="Arial" panose="020B0604020202020204" pitchFamily="34" charset="0"/>
+              </a:rPr>
+              <a:t>ODBC</a:t>
+            </a:r>
+          </a:p>
+        </p:txBody>
+      </p:sp>
+      <p:sp>
+        <p:nvSpPr>
+          <p:cNvPr id="159" name="TextBox 158">
+            <a:extLst>
+              <a:ext uri="{FF2B5EF4-FFF2-40B4-BE49-F238E27FC236}">
+                <a16:creationId xmlns:a16="http://schemas.microsoft.com/office/drawing/2014/main" id="{6C179B91-8A02-9A44-8B3B-CF2AAD06C238}"/>
+              </a:ext>
+            </a:extLst>
+          </p:cNvPr>
+          <p:cNvSpPr txBox="1"/>
+          <p:nvPr/>
+        </p:nvSpPr>
+        <p:spPr>
+          <a:xfrm>
+            <a:off x="9530748" y="1715918"/>
+            <a:ext cx="554960" cy="261610"/>
+          </a:xfrm>
+          <a:prstGeom prst="rect">
+            <a:avLst/>
+          </a:prstGeom>
+          <a:noFill/>
+        </p:spPr>
+        <p:txBody>
+          <a:bodyPr wrap="none" rtlCol="0">
+            <a:spAutoFit/>
+          </a:bodyPr>
+          <a:lstStyle/>
+          <a:p>
+            <a:r>
+              <a:rPr lang="en-US" sz="1100" dirty="0">
+                <a:latin typeface="Arial" panose="020B0604020202020204" pitchFamily="34" charset="0"/>
+                <a:ea typeface="Menlo" panose="020B0609030804020204" pitchFamily="49" charset="0"/>
+                <a:cs typeface="Arial" panose="020B0604020202020204" pitchFamily="34" charset="0"/>
+              </a:rPr>
+              <a:t>HTTP</a:t>
+            </a:r>
+          </a:p>
+        </p:txBody>
+      </p:sp>
+      <p:sp>
+        <p:nvSpPr>
+          <p:cNvPr id="160" name="TextBox 159">
+            <a:extLst>
+              <a:ext uri="{FF2B5EF4-FFF2-40B4-BE49-F238E27FC236}">
+                <a16:creationId xmlns:a16="http://schemas.microsoft.com/office/drawing/2014/main" id="{F66DD512-06BD-4043-9904-9D6B218244DB}"/>
+              </a:ext>
+            </a:extLst>
+          </p:cNvPr>
+          <p:cNvSpPr txBox="1"/>
+          <p:nvPr/>
+        </p:nvSpPr>
+        <p:spPr>
+          <a:xfrm>
+            <a:off x="10249831" y="1718222"/>
+            <a:ext cx="554960" cy="261610"/>
+          </a:xfrm>
+          <a:prstGeom prst="rect">
+            <a:avLst/>
+          </a:prstGeom>
+          <a:noFill/>
+        </p:spPr>
+        <p:txBody>
+          <a:bodyPr wrap="none" rtlCol="0">
+            <a:spAutoFit/>
+          </a:bodyPr>
+          <a:lstStyle/>
+          <a:p>
+            <a:r>
+              <a:rPr lang="en-US" sz="1100" dirty="0">
+                <a:latin typeface="Arial" panose="020B0604020202020204" pitchFamily="34" charset="0"/>
+                <a:ea typeface="Menlo" panose="020B0609030804020204" pitchFamily="49" charset="0"/>
+                <a:cs typeface="Arial" panose="020B0604020202020204" pitchFamily="34" charset="0"/>
+              </a:rPr>
+              <a:t>HTTP</a:t>
+            </a:r>
+          </a:p>
+        </p:txBody>
+      </p:sp>
+      <p:sp>
+        <p:nvSpPr>
+          <p:cNvPr id="161" name="TextBox 160">
+            <a:extLst>
+              <a:ext uri="{FF2B5EF4-FFF2-40B4-BE49-F238E27FC236}">
+                <a16:creationId xmlns:a16="http://schemas.microsoft.com/office/drawing/2014/main" id="{8E328C2E-77DD-B54A-A795-894A3F101BB0}"/>
+              </a:ext>
+            </a:extLst>
+          </p:cNvPr>
+          <p:cNvSpPr txBox="1"/>
+          <p:nvPr/>
+        </p:nvSpPr>
+        <p:spPr>
+          <a:xfrm>
+            <a:off x="11586048" y="1707581"/>
+            <a:ext cx="554960" cy="261610"/>
+          </a:xfrm>
+          <a:prstGeom prst="rect">
+            <a:avLst/>
+          </a:prstGeom>
+          <a:noFill/>
+        </p:spPr>
+        <p:txBody>
+          <a:bodyPr wrap="none" rtlCol="0">
+            <a:spAutoFit/>
+          </a:bodyPr>
+          <a:lstStyle/>
+          <a:p>
+            <a:r>
+              <a:rPr lang="en-US" sz="1100" dirty="0">
+                <a:latin typeface="Arial" panose="020B0604020202020204" pitchFamily="34" charset="0"/>
+                <a:ea typeface="Menlo" panose="020B0609030804020204" pitchFamily="49" charset="0"/>
+                <a:cs typeface="Arial" panose="020B0604020202020204" pitchFamily="34" charset="0"/>
+              </a:rPr>
+              <a:t>HTTP</a:t>
+            </a:r>
+          </a:p>
+        </p:txBody>
+      </p:sp>
+      <p:sp>
+        <p:nvSpPr>
+          <p:cNvPr id="162" name="Rectangle 161">
+            <a:extLst>
+              <a:ext uri="{FF2B5EF4-FFF2-40B4-BE49-F238E27FC236}">
+                <a16:creationId xmlns:a16="http://schemas.microsoft.com/office/drawing/2014/main" id="{733AF883-C876-5347-ACEB-C62D4289E6CD}"/>
+              </a:ext>
+            </a:extLst>
+          </p:cNvPr>
+          <p:cNvSpPr/>
+          <p:nvPr/>
+        </p:nvSpPr>
+        <p:spPr>
+          <a:xfrm>
+            <a:off x="11283065" y="6206677"/>
+            <a:ext cx="678481" cy="476273"/>
+          </a:xfrm>
+          <a:prstGeom prst="rect">
+            <a:avLst/>
+          </a:prstGeom>
+          <a:pattFill prst="pct10">
+            <a:fgClr>
+              <a:schemeClr val="accent1"/>
+            </a:fgClr>
+            <a:bgClr>
+              <a:schemeClr val="bg1"/>
+            </a:bgClr>
+          </a:pattFill>
+        </p:spPr>
+        <p:style>
+          <a:lnRef idx="2">
+            <a:schemeClr val="accent1">
+              <a:shade val="50000"/>
+            </a:schemeClr>
+          </a:lnRef>
+          <a:fillRef idx="1">
+            <a:schemeClr val="accent1"/>
+          </a:fillRef>
+          <a:effectRef idx="0">
+            <a:schemeClr val="accent1"/>
+          </a:effectRef>
+          <a:fontRef idx="minor">
+            <a:schemeClr val="lt1"/>
+          </a:fontRef>
+        </p:style>
+        <p:txBody>
+          <a:bodyPr rtlCol="0" anchor="ctr"/>
+          <a:lstStyle/>
+          <a:p>
+            <a:pPr algn="ctr"/>
+            <a:r>
+              <a:rPr lang="en-US" sz="933" dirty="0">
+                <a:solidFill>
+                  <a:schemeClr val="tx1"/>
+                </a:solidFill>
+                <a:latin typeface="Arial" panose="020B0604020202020204" pitchFamily="34" charset="0"/>
+                <a:ea typeface="Menlo" panose="020B0609030804020204" pitchFamily="49" charset="0"/>
+                <a:cs typeface="Arial" panose="020B0604020202020204" pitchFamily="34" charset="0"/>
+              </a:rPr>
+              <a:t>MQ Console</a:t>
+            </a:r>
+          </a:p>
+        </p:txBody>
+      </p:sp>
+      <p:sp>
+        <p:nvSpPr>
+          <p:cNvPr id="2" name="Oval 1">
+            <a:extLst>
+              <a:ext uri="{FF2B5EF4-FFF2-40B4-BE49-F238E27FC236}">
+                <a16:creationId xmlns:a16="http://schemas.microsoft.com/office/drawing/2014/main" id="{8A40C82A-3C4E-5D4E-95D0-A6605AFEEF5C}"/>
+              </a:ext>
+            </a:extLst>
+          </p:cNvPr>
+          <p:cNvSpPr/>
+          <p:nvPr/>
+        </p:nvSpPr>
+        <p:spPr>
+          <a:xfrm>
+            <a:off x="8354327" y="2187933"/>
+            <a:ext cx="91440" cy="91440"/>
+          </a:xfrm>
+          <a:prstGeom prst="ellipse">
+            <a:avLst/>
+          </a:prstGeom>
+        </p:spPr>
+        <p:style>
+          <a:lnRef idx="2">
+            <a:schemeClr val="accent4">
+              <a:shade val="50000"/>
+            </a:schemeClr>
+          </a:lnRef>
+          <a:fillRef idx="1">
+            <a:schemeClr val="accent4"/>
+          </a:fillRef>
+          <a:effectRef idx="0">
+            <a:schemeClr val="accent4"/>
+          </a:effectRef>
+          <a:fontRef idx="minor">
+            <a:schemeClr val="lt1"/>
+          </a:fontRef>
+        </p:style>
+        <p:txBody>
+          <a:bodyPr rtlCol="0" anchor="ctr"/>
+          <a:lstStyle/>
+          <a:p>
+            <a:pPr algn="ctr"/>
+            <a:endParaRPr lang="en-US"/>
+          </a:p>
+        </p:txBody>
+      </p:sp>
+      <p:sp>
+        <p:nvSpPr>
+          <p:cNvPr id="163" name="Oval 162">
+            <a:extLst>
+              <a:ext uri="{FF2B5EF4-FFF2-40B4-BE49-F238E27FC236}">
+                <a16:creationId xmlns:a16="http://schemas.microsoft.com/office/drawing/2014/main" id="{6A9BE580-1F4D-274F-A463-21050968D28A}"/>
+              </a:ext>
+            </a:extLst>
+          </p:cNvPr>
+          <p:cNvSpPr/>
+          <p:nvPr/>
+        </p:nvSpPr>
+        <p:spPr>
+          <a:xfrm>
+            <a:off x="9518951" y="2186815"/>
+            <a:ext cx="91440" cy="91440"/>
+          </a:xfrm>
+          <a:prstGeom prst="ellipse">
+            <a:avLst/>
+          </a:prstGeom>
+        </p:spPr>
+        <p:style>
+          <a:lnRef idx="2">
+            <a:schemeClr val="accent4"/>
+          </a:lnRef>
+          <a:fillRef idx="1">
+            <a:schemeClr val="lt1"/>
+          </a:fillRef>
+          <a:effectRef idx="0">
+            <a:schemeClr val="accent4"/>
+          </a:effectRef>
+          <a:fontRef idx="minor">
+            <a:schemeClr val="dk1"/>
+          </a:fontRef>
+        </p:style>
+        <p:txBody>
+          <a:bodyPr rtlCol="0" anchor="ctr"/>
+          <a:lstStyle/>
+          <a:p>
+            <a:pPr algn="ctr"/>
+            <a:endParaRPr lang="en-US"/>
+          </a:p>
+        </p:txBody>
+      </p:sp>
+      <p:sp>
+        <p:nvSpPr>
+          <p:cNvPr id="164" name="Oval 163">
+            <a:extLst>
+              <a:ext uri="{FF2B5EF4-FFF2-40B4-BE49-F238E27FC236}">
+                <a16:creationId xmlns:a16="http://schemas.microsoft.com/office/drawing/2014/main" id="{A2717728-4332-9347-BF0C-C395A9A4E2AB}"/>
+              </a:ext>
+            </a:extLst>
+          </p:cNvPr>
+          <p:cNvSpPr/>
+          <p:nvPr/>
+        </p:nvSpPr>
+        <p:spPr>
+          <a:xfrm>
+            <a:off x="10221027" y="2198170"/>
+            <a:ext cx="91440" cy="91440"/>
+          </a:xfrm>
+          <a:prstGeom prst="ellipse">
+            <a:avLst/>
+          </a:prstGeom>
+        </p:spPr>
+        <p:style>
+          <a:lnRef idx="2">
+            <a:schemeClr val="accent4"/>
+          </a:lnRef>
+          <a:fillRef idx="1">
+            <a:schemeClr val="lt1"/>
+          </a:fillRef>
+          <a:effectRef idx="0">
+            <a:schemeClr val="accent4"/>
+          </a:effectRef>
+          <a:fontRef idx="minor">
+            <a:schemeClr val="dk1"/>
+          </a:fontRef>
+        </p:style>
+        <p:txBody>
+          <a:bodyPr rtlCol="0" anchor="ctr"/>
+          <a:lstStyle/>
+          <a:p>
+            <a:pPr algn="ctr"/>
+            <a:endParaRPr lang="en-US"/>
+          </a:p>
+        </p:txBody>
+      </p:sp>
+      <p:sp>
+        <p:nvSpPr>
+          <p:cNvPr id="165" name="Oval 164">
+            <a:extLst>
+              <a:ext uri="{FF2B5EF4-FFF2-40B4-BE49-F238E27FC236}">
+                <a16:creationId xmlns:a16="http://schemas.microsoft.com/office/drawing/2014/main" id="{C65D0EE2-5666-F84F-B8E2-9EA5A3E48C29}"/>
+              </a:ext>
+            </a:extLst>
+          </p:cNvPr>
+          <p:cNvSpPr/>
+          <p:nvPr/>
+        </p:nvSpPr>
+        <p:spPr>
+          <a:xfrm>
+            <a:off x="10890037" y="2193640"/>
+            <a:ext cx="91440" cy="91440"/>
+          </a:xfrm>
+          <a:prstGeom prst="ellipse">
+            <a:avLst/>
+          </a:prstGeom>
+        </p:spPr>
+        <p:style>
+          <a:lnRef idx="1">
+            <a:schemeClr val="accent3"/>
+          </a:lnRef>
+          <a:fillRef idx="2">
+            <a:schemeClr val="accent3"/>
+          </a:fillRef>
+          <a:effectRef idx="1">
+            <a:schemeClr val="accent3"/>
+          </a:effectRef>
+          <a:fontRef idx="minor">
+            <a:schemeClr val="dk1"/>
+          </a:fontRef>
+        </p:style>
+        <p:txBody>
+          <a:bodyPr rtlCol="0" anchor="ctr"/>
+          <a:lstStyle/>
+          <a:p>
+            <a:pPr algn="ctr"/>
+            <a:endParaRPr lang="en-US"/>
+          </a:p>
+        </p:txBody>
+      </p:sp>
+      <p:sp>
+        <p:nvSpPr>
+          <p:cNvPr id="166" name="Oval 165">
+            <a:extLst>
+              <a:ext uri="{FF2B5EF4-FFF2-40B4-BE49-F238E27FC236}">
+                <a16:creationId xmlns:a16="http://schemas.microsoft.com/office/drawing/2014/main" id="{449BC4EA-682C-F840-8F01-C487B25B8DAC}"/>
+              </a:ext>
+            </a:extLst>
+          </p:cNvPr>
+          <p:cNvSpPr/>
+          <p:nvPr/>
+        </p:nvSpPr>
+        <p:spPr>
+          <a:xfrm>
+            <a:off x="11560206" y="2189374"/>
+            <a:ext cx="91440" cy="91440"/>
+          </a:xfrm>
+          <a:prstGeom prst="ellipse">
+            <a:avLst/>
+          </a:prstGeom>
+        </p:spPr>
+        <p:style>
+          <a:lnRef idx="2">
+            <a:schemeClr val="accent4"/>
+          </a:lnRef>
+          <a:fillRef idx="1">
+            <a:schemeClr val="lt1"/>
+          </a:fillRef>
+          <a:effectRef idx="0">
+            <a:schemeClr val="accent4"/>
+          </a:effectRef>
+          <a:fontRef idx="minor">
+            <a:schemeClr val="dk1"/>
+          </a:fontRef>
+        </p:style>
+        <p:txBody>
+          <a:bodyPr rtlCol="0" anchor="ctr"/>
+          <a:lstStyle/>
+          <a:p>
+            <a:pPr algn="ctr"/>
+            <a:endParaRPr lang="en-US"/>
+          </a:p>
+        </p:txBody>
+      </p:sp>
+      <p:sp>
+        <p:nvSpPr>
+          <p:cNvPr id="167" name="Oval 166">
+            <a:extLst>
+              <a:ext uri="{FF2B5EF4-FFF2-40B4-BE49-F238E27FC236}">
+                <a16:creationId xmlns:a16="http://schemas.microsoft.com/office/drawing/2014/main" id="{3FFAA281-8F86-DC4E-821B-E7E4E1D66841}"/>
+              </a:ext>
+            </a:extLst>
+          </p:cNvPr>
+          <p:cNvSpPr/>
+          <p:nvPr/>
+        </p:nvSpPr>
+        <p:spPr>
+          <a:xfrm>
+            <a:off x="7170509" y="2183142"/>
+            <a:ext cx="91440" cy="91440"/>
+          </a:xfrm>
+          <a:prstGeom prst="ellipse">
+            <a:avLst/>
+          </a:prstGeom>
+          <a:pattFill prst="wdUpDiag">
+            <a:fgClr>
+              <a:schemeClr val="accent4"/>
+            </a:fgClr>
+            <a:bgClr>
+              <a:schemeClr val="bg1"/>
+            </a:bgClr>
+          </a:pattFill>
+          <a:ln/>
+        </p:spPr>
+        <p:style>
+          <a:lnRef idx="2">
+            <a:schemeClr val="accent4">
+              <a:shade val="50000"/>
+            </a:schemeClr>
+          </a:lnRef>
+          <a:fillRef idx="1">
+            <a:schemeClr val="accent4"/>
+          </a:fillRef>
+          <a:effectRef idx="0">
+            <a:schemeClr val="accent4"/>
+          </a:effectRef>
+          <a:fontRef idx="minor">
+            <a:schemeClr val="lt1"/>
+          </a:fontRef>
+        </p:style>
+        <p:txBody>
+          <a:bodyPr rtlCol="0" anchor="ctr"/>
+          <a:lstStyle/>
+          <a:p>
+            <a:pPr algn="ctr"/>
+            <a:endParaRPr lang="en-US"/>
+          </a:p>
+        </p:txBody>
+      </p:sp>
+      <p:sp>
+        <p:nvSpPr>
+          <p:cNvPr id="168" name="Oval 167">
+            <a:extLst>
+              <a:ext uri="{FF2B5EF4-FFF2-40B4-BE49-F238E27FC236}">
+                <a16:creationId xmlns:a16="http://schemas.microsoft.com/office/drawing/2014/main" id="{10D67AA4-CC42-E14C-86CF-379E98403DAE}"/>
+              </a:ext>
+            </a:extLst>
+          </p:cNvPr>
+          <p:cNvSpPr/>
+          <p:nvPr/>
+        </p:nvSpPr>
+        <p:spPr>
+          <a:xfrm>
+            <a:off x="9692640" y="44246"/>
+            <a:ext cx="91440" cy="91440"/>
+          </a:xfrm>
+          <a:prstGeom prst="ellipse">
+            <a:avLst/>
+          </a:prstGeom>
+          <a:pattFill prst="wdUpDiag">
+            <a:fgClr>
+              <a:schemeClr val="accent4"/>
+            </a:fgClr>
+            <a:bgClr>
+              <a:schemeClr val="bg1"/>
+            </a:bgClr>
+          </a:pattFill>
+          <a:ln/>
+        </p:spPr>
+        <p:style>
+          <a:lnRef idx="2">
+            <a:schemeClr val="accent4">
+              <a:shade val="50000"/>
+            </a:schemeClr>
+          </a:lnRef>
+          <a:fillRef idx="1">
+            <a:schemeClr val="accent4"/>
+          </a:fillRef>
+          <a:effectRef idx="0">
+            <a:schemeClr val="accent4"/>
+          </a:effectRef>
+          <a:fontRef idx="minor">
+            <a:schemeClr val="lt1"/>
+          </a:fontRef>
+        </p:style>
+        <p:txBody>
+          <a:bodyPr rtlCol="0" anchor="ctr"/>
+          <a:lstStyle/>
+          <a:p>
+            <a:pPr algn="ctr"/>
+            <a:endParaRPr lang="en-US"/>
+          </a:p>
+        </p:txBody>
+      </p:sp>
+      <p:sp>
+        <p:nvSpPr>
+          <p:cNvPr id="169" name="Oval 168">
+            <a:extLst>
+              <a:ext uri="{FF2B5EF4-FFF2-40B4-BE49-F238E27FC236}">
+                <a16:creationId xmlns:a16="http://schemas.microsoft.com/office/drawing/2014/main" id="{EA199A59-31D0-554E-A7BA-276565A09A4C}"/>
+              </a:ext>
+            </a:extLst>
+          </p:cNvPr>
+          <p:cNvSpPr/>
+          <p:nvPr/>
+        </p:nvSpPr>
+        <p:spPr>
+          <a:xfrm>
+            <a:off x="9692640" y="169569"/>
+            <a:ext cx="91440" cy="91440"/>
+          </a:xfrm>
+          <a:prstGeom prst="ellipse">
+            <a:avLst/>
+          </a:prstGeom>
+        </p:spPr>
+        <p:style>
+          <a:lnRef idx="2">
+            <a:schemeClr val="accent4">
+              <a:shade val="50000"/>
+            </a:schemeClr>
+          </a:lnRef>
+          <a:fillRef idx="1">
+            <a:schemeClr val="accent4"/>
+          </a:fillRef>
+          <a:effectRef idx="0">
+            <a:schemeClr val="accent4"/>
+          </a:effectRef>
+          <a:fontRef idx="minor">
+            <a:schemeClr val="lt1"/>
+          </a:fontRef>
+        </p:style>
+        <p:txBody>
+          <a:bodyPr rtlCol="0" anchor="ctr"/>
+          <a:lstStyle/>
+          <a:p>
+            <a:pPr algn="ctr"/>
+            <a:endParaRPr lang="en-US"/>
+          </a:p>
+        </p:txBody>
+      </p:sp>
+      <p:sp>
+        <p:nvSpPr>
+          <p:cNvPr id="170" name="Oval 169">
+            <a:extLst>
+              <a:ext uri="{FF2B5EF4-FFF2-40B4-BE49-F238E27FC236}">
+                <a16:creationId xmlns:a16="http://schemas.microsoft.com/office/drawing/2014/main" id="{848D581E-A2E1-874C-8B76-A018D9072EAD}"/>
+              </a:ext>
+            </a:extLst>
+          </p:cNvPr>
+          <p:cNvSpPr/>
+          <p:nvPr/>
+        </p:nvSpPr>
+        <p:spPr>
+          <a:xfrm>
+            <a:off x="9692640" y="299081"/>
+            <a:ext cx="91440" cy="91440"/>
+          </a:xfrm>
+          <a:prstGeom prst="ellipse">
+            <a:avLst/>
+          </a:prstGeom>
+        </p:spPr>
+        <p:style>
+          <a:lnRef idx="2">
+            <a:schemeClr val="accent4"/>
+          </a:lnRef>
+          <a:fillRef idx="1">
+            <a:schemeClr val="lt1"/>
+          </a:fillRef>
+          <a:effectRef idx="0">
+            <a:schemeClr val="accent4"/>
+          </a:effectRef>
+          <a:fontRef idx="minor">
+            <a:schemeClr val="dk1"/>
+          </a:fontRef>
+        </p:style>
+        <p:txBody>
+          <a:bodyPr rtlCol="0" anchor="ctr"/>
+          <a:lstStyle/>
+          <a:p>
+            <a:pPr algn="ctr"/>
+            <a:endParaRPr lang="en-US"/>
+          </a:p>
+        </p:txBody>
+      </p:sp>
+      <p:sp>
+        <p:nvSpPr>
+          <p:cNvPr id="171" name="Oval 170">
+            <a:extLst>
+              <a:ext uri="{FF2B5EF4-FFF2-40B4-BE49-F238E27FC236}">
+                <a16:creationId xmlns:a16="http://schemas.microsoft.com/office/drawing/2014/main" id="{3D1198A5-7CD4-DE44-8A32-96F8E3E0B47C}"/>
+              </a:ext>
+            </a:extLst>
+          </p:cNvPr>
+          <p:cNvSpPr/>
+          <p:nvPr/>
+        </p:nvSpPr>
+        <p:spPr>
+          <a:xfrm>
+            <a:off x="9692640" y="424976"/>
+            <a:ext cx="91440" cy="91440"/>
+          </a:xfrm>
+          <a:prstGeom prst="ellipse">
+            <a:avLst/>
+          </a:prstGeom>
+        </p:spPr>
+        <p:style>
+          <a:lnRef idx="1">
+            <a:schemeClr val="accent3"/>
+          </a:lnRef>
+          <a:fillRef idx="2">
+            <a:schemeClr val="accent3"/>
+          </a:fillRef>
+          <a:effectRef idx="1">
+            <a:schemeClr val="accent3"/>
+          </a:effectRef>
+          <a:fontRef idx="minor">
+            <a:schemeClr val="dk1"/>
+          </a:fontRef>
+        </p:style>
+        <p:txBody>
+          <a:bodyPr rtlCol="0" anchor="ctr"/>
+          <a:lstStyle/>
+          <a:p>
+            <a:pPr algn="ctr"/>
+            <a:endParaRPr lang="en-US"/>
+          </a:p>
+        </p:txBody>
+      </p:sp>
+      <p:sp>
+        <p:nvSpPr>
+          <p:cNvPr id="4" name="TextBox 3">
+            <a:extLst>
+              <a:ext uri="{FF2B5EF4-FFF2-40B4-BE49-F238E27FC236}">
+                <a16:creationId xmlns:a16="http://schemas.microsoft.com/office/drawing/2014/main" id="{F4AA1F7F-45D5-7844-8BD4-F9FCE200EBD0}"/>
+              </a:ext>
+            </a:extLst>
+          </p:cNvPr>
+          <p:cNvSpPr txBox="1"/>
+          <p:nvPr/>
+        </p:nvSpPr>
+        <p:spPr>
+          <a:xfrm>
+            <a:off x="9865561" y="22680"/>
+            <a:ext cx="2035928" cy="123111"/>
+          </a:xfrm>
+          <a:prstGeom prst="rect">
+            <a:avLst/>
+          </a:prstGeom>
+          <a:noFill/>
+        </p:spPr>
+        <p:txBody>
+          <a:bodyPr wrap="square" lIns="0" tIns="0" rIns="0" bIns="0" rtlCol="0">
+            <a:spAutoFit/>
+          </a:bodyPr>
+          <a:lstStyle/>
+          <a:p>
+            <a:r>
+              <a:rPr lang="en-US" sz="800" dirty="0"/>
+              <a:t>Some CLI extensions support API ML</a:t>
+            </a:r>
+          </a:p>
+        </p:txBody>
+      </p:sp>
+      <p:sp>
+        <p:nvSpPr>
+          <p:cNvPr id="172" name="TextBox 171">
+            <a:extLst>
+              <a:ext uri="{FF2B5EF4-FFF2-40B4-BE49-F238E27FC236}">
+                <a16:creationId xmlns:a16="http://schemas.microsoft.com/office/drawing/2014/main" id="{1CF11923-4311-4749-94C5-92A86A5DD947}"/>
+              </a:ext>
+            </a:extLst>
+          </p:cNvPr>
+          <p:cNvSpPr txBox="1"/>
+          <p:nvPr/>
+        </p:nvSpPr>
+        <p:spPr>
+          <a:xfrm>
+            <a:off x="9870320" y="146505"/>
+            <a:ext cx="2035928" cy="123111"/>
+          </a:xfrm>
+          <a:prstGeom prst="rect">
+            <a:avLst/>
+          </a:prstGeom>
+          <a:noFill/>
+        </p:spPr>
+        <p:txBody>
+          <a:bodyPr wrap="square" lIns="0" tIns="0" rIns="0" bIns="0" rtlCol="0">
+            <a:spAutoFit/>
+          </a:bodyPr>
+          <a:lstStyle/>
+          <a:p>
+            <a:r>
+              <a:rPr lang="en-US" sz="800" dirty="0"/>
+              <a:t>CLI extension supports API ML</a:t>
+            </a:r>
+          </a:p>
+        </p:txBody>
+      </p:sp>
+      <p:sp>
+        <p:nvSpPr>
+          <p:cNvPr id="173" name="TextBox 172">
+            <a:extLst>
+              <a:ext uri="{FF2B5EF4-FFF2-40B4-BE49-F238E27FC236}">
+                <a16:creationId xmlns:a16="http://schemas.microsoft.com/office/drawing/2014/main" id="{B216C184-3E49-204D-8E4F-A3AC4F47D656}"/>
+              </a:ext>
+            </a:extLst>
+          </p:cNvPr>
+          <p:cNvSpPr txBox="1"/>
+          <p:nvPr/>
+        </p:nvSpPr>
+        <p:spPr>
+          <a:xfrm>
+            <a:off x="9865560" y="284127"/>
+            <a:ext cx="2035928" cy="123111"/>
+          </a:xfrm>
+          <a:prstGeom prst="rect">
+            <a:avLst/>
+          </a:prstGeom>
+          <a:noFill/>
+        </p:spPr>
+        <p:txBody>
+          <a:bodyPr wrap="square" lIns="0" tIns="0" rIns="0" bIns="0" rtlCol="0">
+            <a:spAutoFit/>
+          </a:bodyPr>
+          <a:lstStyle/>
+          <a:p>
+            <a:r>
+              <a:rPr lang="en-US" sz="800" dirty="0"/>
+              <a:t>CLI extension does not support API ML</a:t>
+            </a:r>
+          </a:p>
+        </p:txBody>
+      </p:sp>
+      <p:sp>
+        <p:nvSpPr>
+          <p:cNvPr id="174" name="TextBox 173">
+            <a:extLst>
+              <a:ext uri="{FF2B5EF4-FFF2-40B4-BE49-F238E27FC236}">
+                <a16:creationId xmlns:a16="http://schemas.microsoft.com/office/drawing/2014/main" id="{B4E41921-B5A5-014D-B449-14B6D1A96B08}"/>
+              </a:ext>
+            </a:extLst>
+          </p:cNvPr>
+          <p:cNvSpPr txBox="1"/>
+          <p:nvPr/>
+        </p:nvSpPr>
+        <p:spPr>
+          <a:xfrm>
+            <a:off x="9865858" y="406668"/>
+            <a:ext cx="2218743" cy="123111"/>
+          </a:xfrm>
+          <a:prstGeom prst="rect">
+            <a:avLst/>
+          </a:prstGeom>
+          <a:noFill/>
+        </p:spPr>
+        <p:txBody>
+          <a:bodyPr wrap="square" lIns="0" tIns="0" rIns="0" bIns="0" rtlCol="0">
+            <a:spAutoFit/>
+          </a:bodyPr>
+          <a:lstStyle/>
+          <a:p>
+            <a:r>
+              <a:rPr lang="en-US" sz="800" dirty="0"/>
+              <a:t>CLI extension uses protocol not supported by API ML</a:t>
             </a:r>
           </a:p>
         </p:txBody>

</xml_diff>